<commit_message>
modified: 8. Formatting Code
</commit_message>
<xml_diff>
--- a/8. Formatting Code.pptx
+++ b/8. Formatting Code.pptx
@@ -15,6 +15,13 @@
     <p:sldId id="264" r:id="rId9"/>
     <p:sldId id="266" r:id="rId10"/>
     <p:sldId id="267" r:id="rId11"/>
+    <p:sldId id="268" r:id="rId12"/>
+    <p:sldId id="269" r:id="rId13"/>
+    <p:sldId id="270" r:id="rId14"/>
+    <p:sldId id="271" r:id="rId15"/>
+    <p:sldId id="272" r:id="rId16"/>
+    <p:sldId id="273" r:id="rId17"/>
+    <p:sldId id="274" r:id="rId18"/>
   </p:sldIdLst>
   <p:sldSz cx="12192000" cy="6858000"/>
   <p:notesSz cx="6858000" cy="9144000"/>
@@ -3522,6 +3529,426 @@
 </p:sld>
 </file>
 
+<file path=ppt/slides/slide11.xml><?xml version="1.0" encoding="utf-8"?>
+<p:sld xmlns:a="http://schemas.openxmlformats.org/drawingml/2006/main" xmlns:r="http://schemas.openxmlformats.org/officeDocument/2006/relationships" xmlns:p="http://schemas.openxmlformats.org/presentationml/2006/main">
+  <p:cSld>
+    <p:spTree>
+      <p:nvGrpSpPr>
+        <p:cNvPr id="1" name=""/>
+        <p:cNvGrpSpPr/>
+        <p:nvPr/>
+      </p:nvGrpSpPr>
+      <p:grpSpPr>
+        <a:xfrm>
+          <a:off x="0" y="0"/>
+          <a:ext cx="0" cy="0"/>
+          <a:chOff x="0" y="0"/>
+          <a:chExt cx="0" cy="0"/>
+        </a:xfrm>
+      </p:grpSpPr>
+      <p:pic>
+        <p:nvPicPr>
+          <p:cNvPr id="2" name="Picture 1">
+            <a:extLst>
+              <a:ext uri="{FF2B5EF4-FFF2-40B4-BE49-F238E27FC236}">
+                <a16:creationId xmlns:a16="http://schemas.microsoft.com/office/drawing/2014/main" id="{71B7967C-44EA-4777-A9BC-E9DD62267A1E}"/>
+              </a:ext>
+            </a:extLst>
+          </p:cNvPr>
+          <p:cNvPicPr>
+            <a:picLocks noChangeAspect="1"/>
+          </p:cNvPicPr>
+          <p:nvPr/>
+        </p:nvPicPr>
+        <p:blipFill>
+          <a:blip r:embed="rId2"/>
+          <a:stretch>
+            <a:fillRect/>
+          </a:stretch>
+        </p:blipFill>
+        <p:spPr>
+          <a:xfrm>
+            <a:off x="0" y="1673"/>
+            <a:ext cx="12192000" cy="6854653"/>
+          </a:xfrm>
+          <a:prstGeom prst="rect">
+            <a:avLst/>
+          </a:prstGeom>
+        </p:spPr>
+      </p:pic>
+    </p:spTree>
+    <p:extLst>
+      <p:ext uri="{BB962C8B-B14F-4D97-AF65-F5344CB8AC3E}">
+        <p14:creationId xmlns:p14="http://schemas.microsoft.com/office/powerpoint/2010/main" val="3268157098"/>
+      </p:ext>
+    </p:extLst>
+  </p:cSld>
+  <p:clrMapOvr>
+    <a:masterClrMapping/>
+  </p:clrMapOvr>
+</p:sld>
+</file>
+
+<file path=ppt/slides/slide12.xml><?xml version="1.0" encoding="utf-8"?>
+<p:sld xmlns:a="http://schemas.openxmlformats.org/drawingml/2006/main" xmlns:r="http://schemas.openxmlformats.org/officeDocument/2006/relationships" xmlns:p="http://schemas.openxmlformats.org/presentationml/2006/main">
+  <p:cSld>
+    <p:spTree>
+      <p:nvGrpSpPr>
+        <p:cNvPr id="1" name=""/>
+        <p:cNvGrpSpPr/>
+        <p:nvPr/>
+      </p:nvGrpSpPr>
+      <p:grpSpPr>
+        <a:xfrm>
+          <a:off x="0" y="0"/>
+          <a:ext cx="0" cy="0"/>
+          <a:chOff x="0" y="0"/>
+          <a:chExt cx="0" cy="0"/>
+        </a:xfrm>
+      </p:grpSpPr>
+      <p:pic>
+        <p:nvPicPr>
+          <p:cNvPr id="2" name="Picture 1">
+            <a:extLst>
+              <a:ext uri="{FF2B5EF4-FFF2-40B4-BE49-F238E27FC236}">
+                <a16:creationId xmlns:a16="http://schemas.microsoft.com/office/drawing/2014/main" id="{F2704CFF-0282-4400-B6E5-627B32E039A7}"/>
+              </a:ext>
+            </a:extLst>
+          </p:cNvPr>
+          <p:cNvPicPr>
+            <a:picLocks noChangeAspect="1"/>
+          </p:cNvPicPr>
+          <p:nvPr/>
+        </p:nvPicPr>
+        <p:blipFill>
+          <a:blip r:embed="rId2"/>
+          <a:stretch>
+            <a:fillRect/>
+          </a:stretch>
+        </p:blipFill>
+        <p:spPr>
+          <a:xfrm>
+            <a:off x="0" y="1673"/>
+            <a:ext cx="12192000" cy="6854653"/>
+          </a:xfrm>
+          <a:prstGeom prst="rect">
+            <a:avLst/>
+          </a:prstGeom>
+        </p:spPr>
+      </p:pic>
+    </p:spTree>
+    <p:extLst>
+      <p:ext uri="{BB962C8B-B14F-4D97-AF65-F5344CB8AC3E}">
+        <p14:creationId xmlns:p14="http://schemas.microsoft.com/office/powerpoint/2010/main" val="2493590765"/>
+      </p:ext>
+    </p:extLst>
+  </p:cSld>
+  <p:clrMapOvr>
+    <a:masterClrMapping/>
+  </p:clrMapOvr>
+</p:sld>
+</file>
+
+<file path=ppt/slides/slide13.xml><?xml version="1.0" encoding="utf-8"?>
+<p:sld xmlns:a="http://schemas.openxmlformats.org/drawingml/2006/main" xmlns:r="http://schemas.openxmlformats.org/officeDocument/2006/relationships" xmlns:p="http://schemas.openxmlformats.org/presentationml/2006/main">
+  <p:cSld>
+    <p:spTree>
+      <p:nvGrpSpPr>
+        <p:cNvPr id="1" name=""/>
+        <p:cNvGrpSpPr/>
+        <p:nvPr/>
+      </p:nvGrpSpPr>
+      <p:grpSpPr>
+        <a:xfrm>
+          <a:off x="0" y="0"/>
+          <a:ext cx="0" cy="0"/>
+          <a:chOff x="0" y="0"/>
+          <a:chExt cx="0" cy="0"/>
+        </a:xfrm>
+      </p:grpSpPr>
+      <p:pic>
+        <p:nvPicPr>
+          <p:cNvPr id="2" name="Picture 1">
+            <a:extLst>
+              <a:ext uri="{FF2B5EF4-FFF2-40B4-BE49-F238E27FC236}">
+                <a16:creationId xmlns:a16="http://schemas.microsoft.com/office/drawing/2014/main" id="{31D0636F-1C68-4F34-A53D-847D95283F90}"/>
+              </a:ext>
+            </a:extLst>
+          </p:cNvPr>
+          <p:cNvPicPr>
+            <a:picLocks noChangeAspect="1"/>
+          </p:cNvPicPr>
+          <p:nvPr/>
+        </p:nvPicPr>
+        <p:blipFill>
+          <a:blip r:embed="rId2"/>
+          <a:stretch>
+            <a:fillRect/>
+          </a:stretch>
+        </p:blipFill>
+        <p:spPr>
+          <a:xfrm>
+            <a:off x="0" y="1673"/>
+            <a:ext cx="12192000" cy="6854653"/>
+          </a:xfrm>
+          <a:prstGeom prst="rect">
+            <a:avLst/>
+          </a:prstGeom>
+        </p:spPr>
+      </p:pic>
+    </p:spTree>
+    <p:extLst>
+      <p:ext uri="{BB962C8B-B14F-4D97-AF65-F5344CB8AC3E}">
+        <p14:creationId xmlns:p14="http://schemas.microsoft.com/office/powerpoint/2010/main" val="2228173748"/>
+      </p:ext>
+    </p:extLst>
+  </p:cSld>
+  <p:clrMapOvr>
+    <a:masterClrMapping/>
+  </p:clrMapOvr>
+</p:sld>
+</file>
+
+<file path=ppt/slides/slide14.xml><?xml version="1.0" encoding="utf-8"?>
+<p:sld xmlns:a="http://schemas.openxmlformats.org/drawingml/2006/main" xmlns:r="http://schemas.openxmlformats.org/officeDocument/2006/relationships" xmlns:p="http://schemas.openxmlformats.org/presentationml/2006/main">
+  <p:cSld>
+    <p:spTree>
+      <p:nvGrpSpPr>
+        <p:cNvPr id="1" name=""/>
+        <p:cNvGrpSpPr/>
+        <p:nvPr/>
+      </p:nvGrpSpPr>
+      <p:grpSpPr>
+        <a:xfrm>
+          <a:off x="0" y="0"/>
+          <a:ext cx="0" cy="0"/>
+          <a:chOff x="0" y="0"/>
+          <a:chExt cx="0" cy="0"/>
+        </a:xfrm>
+      </p:grpSpPr>
+      <p:pic>
+        <p:nvPicPr>
+          <p:cNvPr id="2" name="Picture 1">
+            <a:extLst>
+              <a:ext uri="{FF2B5EF4-FFF2-40B4-BE49-F238E27FC236}">
+                <a16:creationId xmlns:a16="http://schemas.microsoft.com/office/drawing/2014/main" id="{50A804A4-8C32-419D-9F1D-4573EA4BB309}"/>
+              </a:ext>
+            </a:extLst>
+          </p:cNvPr>
+          <p:cNvPicPr>
+            <a:picLocks noChangeAspect="1"/>
+          </p:cNvPicPr>
+          <p:nvPr/>
+        </p:nvPicPr>
+        <p:blipFill>
+          <a:blip r:embed="rId2"/>
+          <a:stretch>
+            <a:fillRect/>
+          </a:stretch>
+        </p:blipFill>
+        <p:spPr>
+          <a:xfrm>
+            <a:off x="0" y="1673"/>
+            <a:ext cx="12192000" cy="6854653"/>
+          </a:xfrm>
+          <a:prstGeom prst="rect">
+            <a:avLst/>
+          </a:prstGeom>
+        </p:spPr>
+      </p:pic>
+    </p:spTree>
+    <p:extLst>
+      <p:ext uri="{BB962C8B-B14F-4D97-AF65-F5344CB8AC3E}">
+        <p14:creationId xmlns:p14="http://schemas.microsoft.com/office/powerpoint/2010/main" val="1169862552"/>
+      </p:ext>
+    </p:extLst>
+  </p:cSld>
+  <p:clrMapOvr>
+    <a:masterClrMapping/>
+  </p:clrMapOvr>
+</p:sld>
+</file>
+
+<file path=ppt/slides/slide15.xml><?xml version="1.0" encoding="utf-8"?>
+<p:sld xmlns:a="http://schemas.openxmlformats.org/drawingml/2006/main" xmlns:r="http://schemas.openxmlformats.org/officeDocument/2006/relationships" xmlns:p="http://schemas.openxmlformats.org/presentationml/2006/main">
+  <p:cSld>
+    <p:spTree>
+      <p:nvGrpSpPr>
+        <p:cNvPr id="1" name=""/>
+        <p:cNvGrpSpPr/>
+        <p:nvPr/>
+      </p:nvGrpSpPr>
+      <p:grpSpPr>
+        <a:xfrm>
+          <a:off x="0" y="0"/>
+          <a:ext cx="0" cy="0"/>
+          <a:chOff x="0" y="0"/>
+          <a:chExt cx="0" cy="0"/>
+        </a:xfrm>
+      </p:grpSpPr>
+      <p:pic>
+        <p:nvPicPr>
+          <p:cNvPr id="2" name="Picture 1">
+            <a:extLst>
+              <a:ext uri="{FF2B5EF4-FFF2-40B4-BE49-F238E27FC236}">
+                <a16:creationId xmlns:a16="http://schemas.microsoft.com/office/drawing/2014/main" id="{E239C929-7D72-497B-B90E-0DE2E7D02CC9}"/>
+              </a:ext>
+            </a:extLst>
+          </p:cNvPr>
+          <p:cNvPicPr>
+            <a:picLocks noChangeAspect="1"/>
+          </p:cNvPicPr>
+          <p:nvPr/>
+        </p:nvPicPr>
+        <p:blipFill>
+          <a:blip r:embed="rId2"/>
+          <a:stretch>
+            <a:fillRect/>
+          </a:stretch>
+        </p:blipFill>
+        <p:spPr>
+          <a:xfrm>
+            <a:off x="0" y="1673"/>
+            <a:ext cx="12192000" cy="6854653"/>
+          </a:xfrm>
+          <a:prstGeom prst="rect">
+            <a:avLst/>
+          </a:prstGeom>
+        </p:spPr>
+      </p:pic>
+    </p:spTree>
+    <p:extLst>
+      <p:ext uri="{BB962C8B-B14F-4D97-AF65-F5344CB8AC3E}">
+        <p14:creationId xmlns:p14="http://schemas.microsoft.com/office/powerpoint/2010/main" val="2614941540"/>
+      </p:ext>
+    </p:extLst>
+  </p:cSld>
+  <p:clrMapOvr>
+    <a:masterClrMapping/>
+  </p:clrMapOvr>
+</p:sld>
+</file>
+
+<file path=ppt/slides/slide16.xml><?xml version="1.0" encoding="utf-8"?>
+<p:sld xmlns:a="http://schemas.openxmlformats.org/drawingml/2006/main" xmlns:r="http://schemas.openxmlformats.org/officeDocument/2006/relationships" xmlns:p="http://schemas.openxmlformats.org/presentationml/2006/main">
+  <p:cSld>
+    <p:spTree>
+      <p:nvGrpSpPr>
+        <p:cNvPr id="1" name=""/>
+        <p:cNvGrpSpPr/>
+        <p:nvPr/>
+      </p:nvGrpSpPr>
+      <p:grpSpPr>
+        <a:xfrm>
+          <a:off x="0" y="0"/>
+          <a:ext cx="0" cy="0"/>
+          <a:chOff x="0" y="0"/>
+          <a:chExt cx="0" cy="0"/>
+        </a:xfrm>
+      </p:grpSpPr>
+      <p:pic>
+        <p:nvPicPr>
+          <p:cNvPr id="2" name="Picture 1">
+            <a:extLst>
+              <a:ext uri="{FF2B5EF4-FFF2-40B4-BE49-F238E27FC236}">
+                <a16:creationId xmlns:a16="http://schemas.microsoft.com/office/drawing/2014/main" id="{13D7E149-DF15-4066-9681-2625DB5D4958}"/>
+              </a:ext>
+            </a:extLst>
+          </p:cNvPr>
+          <p:cNvPicPr>
+            <a:picLocks noChangeAspect="1"/>
+          </p:cNvPicPr>
+          <p:nvPr/>
+        </p:nvPicPr>
+        <p:blipFill>
+          <a:blip r:embed="rId2"/>
+          <a:stretch>
+            <a:fillRect/>
+          </a:stretch>
+        </p:blipFill>
+        <p:spPr>
+          <a:xfrm>
+            <a:off x="0" y="1673"/>
+            <a:ext cx="12192000" cy="6854653"/>
+          </a:xfrm>
+          <a:prstGeom prst="rect">
+            <a:avLst/>
+          </a:prstGeom>
+        </p:spPr>
+      </p:pic>
+    </p:spTree>
+    <p:extLst>
+      <p:ext uri="{BB962C8B-B14F-4D97-AF65-F5344CB8AC3E}">
+        <p14:creationId xmlns:p14="http://schemas.microsoft.com/office/powerpoint/2010/main" val="1844783483"/>
+      </p:ext>
+    </p:extLst>
+  </p:cSld>
+  <p:clrMapOvr>
+    <a:masterClrMapping/>
+  </p:clrMapOvr>
+</p:sld>
+</file>
+
+<file path=ppt/slides/slide17.xml><?xml version="1.0" encoding="utf-8"?>
+<p:sld xmlns:a="http://schemas.openxmlformats.org/drawingml/2006/main" xmlns:r="http://schemas.openxmlformats.org/officeDocument/2006/relationships" xmlns:p="http://schemas.openxmlformats.org/presentationml/2006/main">
+  <p:cSld>
+    <p:spTree>
+      <p:nvGrpSpPr>
+        <p:cNvPr id="1" name=""/>
+        <p:cNvGrpSpPr/>
+        <p:nvPr/>
+      </p:nvGrpSpPr>
+      <p:grpSpPr>
+        <a:xfrm>
+          <a:off x="0" y="0"/>
+          <a:ext cx="0" cy="0"/>
+          <a:chOff x="0" y="0"/>
+          <a:chExt cx="0" cy="0"/>
+        </a:xfrm>
+      </p:grpSpPr>
+      <p:pic>
+        <p:nvPicPr>
+          <p:cNvPr id="4" name="Picture 3">
+            <a:extLst>
+              <a:ext uri="{FF2B5EF4-FFF2-40B4-BE49-F238E27FC236}">
+                <a16:creationId xmlns:a16="http://schemas.microsoft.com/office/drawing/2014/main" id="{1E6CD9CF-4FED-4FFE-82A9-DE3B20EF47DB}"/>
+              </a:ext>
+            </a:extLst>
+          </p:cNvPr>
+          <p:cNvPicPr>
+            <a:picLocks noChangeAspect="1"/>
+          </p:cNvPicPr>
+          <p:nvPr/>
+        </p:nvPicPr>
+        <p:blipFill>
+          <a:blip r:embed="rId2"/>
+          <a:stretch>
+            <a:fillRect/>
+          </a:stretch>
+        </p:blipFill>
+        <p:spPr>
+          <a:xfrm>
+            <a:off x="0" y="1673"/>
+            <a:ext cx="12192000" cy="6854653"/>
+          </a:xfrm>
+          <a:prstGeom prst="rect">
+            <a:avLst/>
+          </a:prstGeom>
+        </p:spPr>
+      </p:pic>
+    </p:spTree>
+    <p:extLst>
+      <p:ext uri="{BB962C8B-B14F-4D97-AF65-F5344CB8AC3E}">
+        <p14:creationId xmlns:p14="http://schemas.microsoft.com/office/powerpoint/2010/main" val="2780739512"/>
+      </p:ext>
+    </p:extLst>
+  </p:cSld>
+  <p:clrMapOvr>
+    <a:masterClrMapping/>
+  </p:clrMapOvr>
+</p:sld>
+</file>
+
 <file path=ppt/slides/slide2.xml><?xml version="1.0" encoding="utf-8"?>
 <p:sld xmlns:a="http://schemas.openxmlformats.org/drawingml/2006/main" xmlns:r="http://schemas.openxmlformats.org/officeDocument/2006/relationships" xmlns:p="http://schemas.openxmlformats.org/presentationml/2006/main">
   <p:cSld>

</xml_diff>